<commit_message>
Push new copy of PowerPoint
</commit_message>
<xml_diff>
--- a/sandbox/CPS_Vote.pptx
+++ b/sandbox/CPS_Vote.pptx
@@ -4045,10 +4045,14 @@
               <a:t>Familiarity with installing R packages from </a:t>
             </a:r>
             <a:r>
-              <a:rPr lang="en-US" dirty="0" err="1"/>
+              <a:rPr lang="en-US" dirty="0" err="1">
+                <a:latin typeface="Courier" pitchFamily="2" charset="0"/>
+              </a:rPr>
               <a:t>github</a:t>
             </a:r>
-            <a:endParaRPr lang="en-US" dirty="0"/>
+            <a:endParaRPr lang="en-US" dirty="0">
+              <a:latin typeface="Courier" pitchFamily="2" charset="0"/>
+            </a:endParaRPr>
           </a:p>
         </p:txBody>
       </p:sp>
@@ -4308,7 +4312,7 @@
                 </a:solidFill>
                 <a:latin typeface="Courier" pitchFamily="2" charset="0"/>
               </a:rPr>
-              <a:t>(years=seq(2008,2016,2))</a:t>
+              <a:t>(years=seq(2008,2018,2))</a:t>
             </a:r>
             <a:br>
               <a:rPr lang="en-US" sz="2000" dirty="0">
@@ -4325,7 +4329,7 @@
                 </a:solidFill>
                 <a:latin typeface="Courier" pitchFamily="2" charset="0"/>
               </a:rPr>
-              <a:t>                      #download 2008-2016</a:t>
+              <a:t>                      #download 2008-2018</a:t>
             </a:r>
           </a:p>
           <a:p>
@@ -4409,7 +4413,7 @@
                 </a:solidFill>
                 <a:latin typeface="Courier" pitchFamily="2" charset="0"/>
               </a:rPr>
-              <a:t> &lt;_ </a:t>
+              <a:t> &lt;- </a:t>
             </a:r>
             <a:r>
               <a:rPr lang="en-US" sz="2000" dirty="0" err="1">
@@ -4427,7 +4431,7 @@
                 </a:solidFill>
                 <a:latin typeface="Courier" pitchFamily="2" charset="0"/>
               </a:rPr>
-              <a:t> (years=seq(2008,2016,2))</a:t>
+              <a:t> (years=seq(2008,2018,2))</a:t>
             </a:r>
             <a:br>
               <a:rPr lang="en-US" sz="2000" dirty="0">
@@ -4444,7 +4448,7 @@
                 </a:solidFill>
                 <a:latin typeface="Courier" pitchFamily="2" charset="0"/>
               </a:rPr>
-              <a:t>                      #read 2008-2016</a:t>
+              <a:t>                      #read 2008-2018</a:t>
             </a:r>
           </a:p>
           <a:p>
@@ -5366,7 +5370,7 @@
                 </a:solidFill>
                 <a:latin typeface="Courier" pitchFamily="2" charset="0"/>
               </a:rPr>
-              <a:t>( ~ 1 , data = </a:t>
+              <a:t>( ~ 1, data = </a:t>
             </a:r>
             <a:r>
               <a:rPr lang="en-US" sz="2000" dirty="0" err="1">
@@ -5401,7 +5405,25 @@
                 </a:solidFill>
                 <a:latin typeface="Courier" pitchFamily="2" charset="0"/>
               </a:rPr>
-              <a:t>									  weights = ~ WEIGHT)</a:t>
+              <a:t>									  weights </a:t>
+            </a:r>
+            <a:r>
+              <a:rPr lang="en-US" sz="2000">
+                <a:solidFill>
+                  <a:srgbClr val="FF0000"/>
+                </a:solidFill>
+                <a:latin typeface="Courier" pitchFamily="2" charset="0"/>
+              </a:rPr>
+              <a:t>= ~WEIGHT</a:t>
+            </a:r>
+            <a:r>
+              <a:rPr lang="en-US" sz="2000" dirty="0">
+                <a:solidFill>
+                  <a:srgbClr val="FF0000"/>
+                </a:solidFill>
+                <a:latin typeface="Courier" pitchFamily="2" charset="0"/>
+              </a:rPr>
+              <a:t>)</a:t>
             </a:r>
             <a:br>
               <a:rPr lang="en-US" sz="2000" dirty="0">

</xml_diff>